<commit_message>
some grammatical mistakes fixed in the ppt
</commit_message>
<xml_diff>
--- a/react-redux-chart-explanation.pptx
+++ b/react-redux-chart-explanation.pptx
@@ -6632,15 +6632,7 @@
           <a:p>
             <a:r>
               <a:rPr lang="en-US" i="1" dirty="0" smtClean="0"/>
-              <a:t>Since we’ll likely </a:t>
-            </a:r>
-            <a:r>
-              <a:rPr lang="en-US" i="1" smtClean="0"/>
-              <a:t>need the list of </a:t>
-            </a:r>
-            <a:r>
-              <a:rPr lang="en-US" i="1" dirty="0" smtClean="0"/>
-              <a:t>artists as soon as we are on this component, let’s just put in the </a:t>
+              <a:t>Since we’ll likely need the list of artists as soon as we are on this component, let’s just put in the </a:t>
             </a:r>
             <a:r>
               <a:rPr lang="en-US" i="1" dirty="0" err="1" smtClean="0"/>
@@ -7611,7 +7603,15 @@
             </a:r>
             <a:r>
               <a:rPr lang="en-US" i="1" dirty="0" smtClean="0"/>
-              <a:t> (and all other reducers too), but if you wrote your reducers and cases correctly, only the </a:t>
+              <a:t> (and all </a:t>
+            </a:r>
+            <a:r>
+              <a:rPr lang="en-US" i="1" smtClean="0"/>
+              <a:t>other reducers) too, </a:t>
+            </a:r>
+            <a:r>
+              <a:rPr lang="en-US" i="1" dirty="0" smtClean="0"/>
+              <a:t>but if you wrote your reducers and cases correctly, only the </a:t>
             </a:r>
             <a:r>
               <a:rPr lang="en-US" i="1" dirty="0" err="1" smtClean="0"/>

</xml_diff>